<commit_message>
commited at 2020-04-13 06:39:50.737847
</commit_message>
<xml_diff>
--- a/Presentations/COVID-19 08-04-2020.pptx
+++ b/Presentations/COVID-19 08-04-2020.pptx
@@ -29,6 +29,7 @@
     <p:sldId id="277" r:id="rId28"/>
     <p:sldId id="278" r:id="rId29"/>
     <p:sldId id="279" r:id="rId30"/>
+    <p:sldId id="280" r:id="rId31"/>
   </p:sldIdLst>
   <p:sldSz cx="9144000" cy="6858000" type="screen4x3"/>
   <p:notesSz cx="6858000" cy="9144000"/>
@@ -4554,6 +4555,90 @@
           <a:p>
             <a:r>
               <a:t>Using 3% mortality rate as reference </a:t>
+            </a:r>
+          </a:p>
+        </p:txBody>
+      </p:sp>
+    </p:spTree>
+  </p:cSld>
+  <p:clrMapOvr>
+    <a:masterClrMapping/>
+  </p:clrMapOvr>
+</p:sld>
+</file>
+
+<file path=ppt/slides/slide25.xml><?xml version="1.0" encoding="utf-8"?>
+<p:sld xmlns:a="http://schemas.openxmlformats.org/drawingml/2006/main" xmlns:p="http://schemas.openxmlformats.org/presentationml/2006/main" xmlns:r="http://schemas.openxmlformats.org/officeDocument/2006/relationships">
+  <p:cSld>
+    <p:spTree>
+      <p:nvGrpSpPr>
+        <p:cNvPr id="1" name=""/>
+        <p:cNvGrpSpPr/>
+        <p:nvPr/>
+      </p:nvGrpSpPr>
+      <p:grpSpPr/>
+      <p:pic>
+        <p:nvPicPr>
+          <p:cNvPr id="5" name="Picture 4" descr="image.png"/>
+          <p:cNvPicPr>
+            <a:picLocks noChangeAspect="1"/>
+          </p:cNvPicPr>
+          <p:nvPr/>
+        </p:nvPicPr>
+        <p:blipFill>
+          <a:blip r:embed="rId2"/>
+          <a:stretch>
+            <a:fillRect/>
+          </a:stretch>
+        </p:blipFill>
+        <p:spPr>
+          <a:xfrm>
+            <a:off x="457200" y="274320"/>
+            <a:ext cx="6858000" cy="4572000"/>
+          </a:xfrm>
+          <a:prstGeom prst="rect">
+            <a:avLst/>
+          </a:prstGeom>
+        </p:spPr>
+      </p:pic>
+      <p:sp>
+        <p:nvSpPr>
+          <p:cNvPr id="2" name="Title 1"/>
+          <p:cNvSpPr>
+            <a:spLocks noGrp="1"/>
+          </p:cNvSpPr>
+          <p:nvPr>
+            <p:ph type="title"/>
+          </p:nvPr>
+        </p:nvSpPr>
+        <p:spPr/>
+        <p:txBody>
+          <a:bodyPr/>
+          <a:lstStyle/>
+          <a:p>
+            <a:r>
+              <a:t>Total Confirmed Cases</a:t>
+            </a:r>
+          </a:p>
+        </p:txBody>
+      </p:sp>
+      <p:sp>
+        <p:nvSpPr>
+          <p:cNvPr id="4" name="Text Placeholder 3"/>
+          <p:cNvSpPr>
+            <a:spLocks noGrp="1"/>
+          </p:cNvSpPr>
+          <p:nvPr>
+            <p:ph type="body" idx="2" sz="half"/>
+          </p:nvPr>
+        </p:nvSpPr>
+        <p:spPr/>
+        <p:txBody>
+          <a:bodyPr/>
+          <a:lstStyle/>
+          <a:p>
+            <a:r>
+              <a:t>By Country</a:t>
             </a:r>
           </a:p>
         </p:txBody>

</xml_diff>